<commit_message>
Added additional safety checking
</commit_message>
<xml_diff>
--- a/demo/PrezPalDemo.pptx
+++ b/demo/PrezPalDemo.pptx
@@ -3343,7 +3343,7 @@
       </p:sp>
       <p:pic xmlns:p="http://schemas.openxmlformats.org/presentationml/2006/main">
         <p:nvPicPr>
-          <p:cNvPr id="3" name="f362c3e2-d379-4631-b648-307fc62977db"/>
+          <p:cNvPr id="3" name="885fe547-f937-41fc-aedb-a9959c74af98"/>
           <p:cNvPicPr>
             <a:picLocks xmlns:a="http://schemas.openxmlformats.org/drawingml/2006/main" noChangeAspect="1" noGrp="1"/>
           </p:cNvPicPr>
@@ -3433,10 +3433,10 @@
           <a:lstStyle/>
           <a:p>
             <a:r>
-              <a:t>Ease and Convenience: No more manually creating slides 
-Dynamic Presentations: Adapt and address audience queries on the fly 
-Efficiency: Save time on slide preparation 
-Engagement: Capture audience attention with real-time content generation</a:t>
+              <a:t>Slides are dynamically generated in real-time 
+Flexibility to introduce new content and address audience questions 
+Saves time and effort in slide preparation 
+Ability to create slides on-demand via voice commands</a:t>
             </a:r>
           </a:p>
         </p:txBody>
@@ -3508,7 +3508,7 @@
       </p:sp>
       <p:pic>
         <p:nvPicPr>
-          <p:cNvPr id="3" name="b4471507-213e-4956-a4c1-30a89fe63805"/>
+          <p:cNvPr id="3" name="7ab5ed06-a3bc-4281-9cb5-e9ad8bbf6125"/>
           <p:cNvPicPr>
             <a:picLocks noChangeAspect="1" noGrp="1"/>
           </p:cNvPicPr>

</xml_diff>